<commit_message>
presentation with repository link
</commit_message>
<xml_diff>
--- a/presentation/Presentation_Vardanian_Katsar.pptx
+++ b/presentation/Presentation_Vardanian_Katsar.pptx
@@ -3902,7 +3902,7 @@
               <a:rPr>
                 <a:latin typeface="Courier"/>
               </a:rPr>
-              <a:t>## success rate = 0.6553398</a:t>
+              <a:t>## success rate = 0.6432039</a:t>
             </a:r>
           </a:p>
         </p:txBody>
@@ -3953,6 +3953,17 @@
             <a:r>
               <a:rPr b="1"/>
               <a:t>VIELEN DANK FÜR DIE AUFMERKSAMKEIT!</a:t>
+            </a:r>
+          </a:p>
+          <a:p>
+            <a:pPr lvl="0" indent="0" marL="0">
+              <a:buNone/>
+            </a:pPr>
+            <a:r>
+              <a:rPr>
+                <a:hlinkClick r:id="rId2"/>
+              </a:rPr>
+              <a:t>https://github.com/aliaksei-katsar/mental_health.git</a:t>
             </a:r>
           </a:p>
         </p:txBody>

</xml_diff>